<commit_message>
Modified slides and added video demo
Demo covers how to track whether objects are on screen or not.
</commit_message>
<xml_diff>
--- a/Modules/ITD/Week 2/Slides/ITD_03_Custom and Multiple Image Targets.pptx
+++ b/Modules/ITD/Week 2/Slides/ITD_03_Custom and Multiple Image Targets.pptx
@@ -5,7 +5,7 @@
     <p:sldMasterId id="2147483660" r:id="rId1"/>
   </p:sldMasterIdLst>
   <p:notesMasterIdLst>
-    <p:notesMasterId r:id="rId32"/>
+    <p:notesMasterId r:id="rId33"/>
   </p:notesMasterIdLst>
   <p:sldIdLst>
     <p:sldId id="256" r:id="rId2"/>
@@ -33,11 +33,12 @@
     <p:sldId id="300" r:id="rId24"/>
     <p:sldId id="301" r:id="rId25"/>
     <p:sldId id="310" r:id="rId26"/>
-    <p:sldId id="311" r:id="rId27"/>
-    <p:sldId id="312" r:id="rId28"/>
-    <p:sldId id="313" r:id="rId29"/>
-    <p:sldId id="314" r:id="rId30"/>
-    <p:sldId id="302" r:id="rId31"/>
+    <p:sldId id="315" r:id="rId27"/>
+    <p:sldId id="311" r:id="rId28"/>
+    <p:sldId id="312" r:id="rId29"/>
+    <p:sldId id="313" r:id="rId30"/>
+    <p:sldId id="314" r:id="rId31"/>
+    <p:sldId id="302" r:id="rId32"/>
   </p:sldIdLst>
   <p:sldSz cx="12192000" cy="6858000"/>
   <p:notesSz cx="6858000" cy="9144000"/>
@@ -226,7 +227,7 @@
           <a:p>
             <a:fld id="{1C633808-4D66-4A18-AEB5-16F5EA9B7D51}" type="datetimeFigureOut">
               <a:rPr lang="en-US" smtClean="0"/>
-              <a:t>10/26/2021</a:t>
+              <a:t>10/28/2021</a:t>
             </a:fld>
             <a:endParaRPr lang="en-US"/>
           </a:p>
@@ -640,7 +641,7 @@
           <a:p>
             <a:fld id="{6C36B2C3-558B-48FB-A029-22CFB7392BA1}" type="datetimeFigureOut">
               <a:rPr lang="en-US" smtClean="0"/>
-              <a:t>10/26/2021</a:t>
+              <a:t>10/28/2021</a:t>
             </a:fld>
             <a:endParaRPr lang="en-US"/>
           </a:p>
@@ -838,7 +839,7 @@
           <a:p>
             <a:fld id="{6C36B2C3-558B-48FB-A029-22CFB7392BA1}" type="datetimeFigureOut">
               <a:rPr lang="en-US" smtClean="0"/>
-              <a:t>10/26/2021</a:t>
+              <a:t>10/28/2021</a:t>
             </a:fld>
             <a:endParaRPr lang="en-US"/>
           </a:p>
@@ -1046,7 +1047,7 @@
           <a:p>
             <a:fld id="{6C36B2C3-558B-48FB-A029-22CFB7392BA1}" type="datetimeFigureOut">
               <a:rPr lang="en-US" smtClean="0"/>
-              <a:t>10/26/2021</a:t>
+              <a:t>10/28/2021</a:t>
             </a:fld>
             <a:endParaRPr lang="en-US"/>
           </a:p>
@@ -1244,7 +1245,7 @@
           <a:p>
             <a:fld id="{6C36B2C3-558B-48FB-A029-22CFB7392BA1}" type="datetimeFigureOut">
               <a:rPr lang="en-US" smtClean="0"/>
-              <a:t>10/26/2021</a:t>
+              <a:t>10/28/2021</a:t>
             </a:fld>
             <a:endParaRPr lang="en-US" dirty="0"/>
           </a:p>
@@ -1690,7 +1691,7 @@
           <a:p>
             <a:fld id="{6C36B2C3-558B-48FB-A029-22CFB7392BA1}" type="datetimeFigureOut">
               <a:rPr lang="en-US" smtClean="0"/>
-              <a:t>10/26/2021</a:t>
+              <a:t>10/28/2021</a:t>
             </a:fld>
             <a:endParaRPr lang="en-US"/>
           </a:p>
@@ -1955,7 +1956,7 @@
           <a:p>
             <a:fld id="{6C36B2C3-558B-48FB-A029-22CFB7392BA1}" type="datetimeFigureOut">
               <a:rPr lang="en-US" smtClean="0"/>
-              <a:t>10/26/2021</a:t>
+              <a:t>10/28/2021</a:t>
             </a:fld>
             <a:endParaRPr lang="en-US"/>
           </a:p>
@@ -2367,7 +2368,7 @@
           <a:p>
             <a:fld id="{6C36B2C3-558B-48FB-A029-22CFB7392BA1}" type="datetimeFigureOut">
               <a:rPr lang="en-US" smtClean="0"/>
-              <a:t>10/26/2021</a:t>
+              <a:t>10/28/2021</a:t>
             </a:fld>
             <a:endParaRPr lang="en-US"/>
           </a:p>
@@ -2508,7 +2509,7 @@
           <a:p>
             <a:fld id="{6C36B2C3-558B-48FB-A029-22CFB7392BA1}" type="datetimeFigureOut">
               <a:rPr lang="en-US" smtClean="0"/>
-              <a:t>10/26/2021</a:t>
+              <a:t>10/28/2021</a:t>
             </a:fld>
             <a:endParaRPr lang="en-US"/>
           </a:p>
@@ -2621,7 +2622,7 @@
           <a:p>
             <a:fld id="{6C36B2C3-558B-48FB-A029-22CFB7392BA1}" type="datetimeFigureOut">
               <a:rPr lang="en-US" smtClean="0"/>
-              <a:t>10/26/2021</a:t>
+              <a:t>10/28/2021</a:t>
             </a:fld>
             <a:endParaRPr lang="en-US"/>
           </a:p>
@@ -2932,7 +2933,7 @@
           <a:p>
             <a:fld id="{6C36B2C3-558B-48FB-A029-22CFB7392BA1}" type="datetimeFigureOut">
               <a:rPr lang="en-US" smtClean="0"/>
-              <a:t>10/26/2021</a:t>
+              <a:t>10/28/2021</a:t>
             </a:fld>
             <a:endParaRPr lang="en-US"/>
           </a:p>
@@ -3223,7 +3224,7 @@
           <a:p>
             <a:fld id="{6C36B2C3-558B-48FB-A029-22CFB7392BA1}" type="datetimeFigureOut">
               <a:rPr lang="en-US" smtClean="0"/>
-              <a:t>10/26/2021</a:t>
+              <a:t>10/28/2021</a:t>
             </a:fld>
             <a:endParaRPr lang="en-US"/>
           </a:p>
@@ -3464,7 +3465,7 @@
           <a:p>
             <a:fld id="{6C36B2C3-558B-48FB-A029-22CFB7392BA1}" type="datetimeFigureOut">
               <a:rPr lang="en-US" smtClean="0"/>
-              <a:t>10/26/2021</a:t>
+              <a:t>10/28/2021</a:t>
             </a:fld>
             <a:endParaRPr lang="en-US"/>
           </a:p>
@@ -8256,10 +8257,10 @@
       </p:grpSpPr>
       <p:sp>
         <p:nvSpPr>
-          <p:cNvPr id="2" name="Title 1">
-            <a:extLst>
-              <a:ext uri="{FF2B5EF4-FFF2-40B4-BE49-F238E27FC236}">
-                <a16:creationId xmlns:a16="http://schemas.microsoft.com/office/drawing/2014/main" id="{264E5970-3812-4B23-BF67-26CB2C14C1EB}"/>
+          <p:cNvPr id="13" name="Title 1">
+            <a:extLst>
+              <a:ext uri="{FF2B5EF4-FFF2-40B4-BE49-F238E27FC236}">
+                <a16:creationId xmlns:a16="http://schemas.microsoft.com/office/drawing/2014/main" id="{AFBCB11E-07F3-48B7-8B47-7E50039C99D4}"/>
               </a:ext>
             </a:extLst>
           </p:cNvPr>
@@ -8270,6 +8271,77 @@
             <p:ph type="title"/>
           </p:nvPr>
         </p:nvSpPr>
+        <p:spPr>
+          <a:xfrm>
+            <a:off x="838200" y="365125"/>
+            <a:ext cx="10515600" cy="5229340"/>
+          </a:xfrm>
+        </p:spPr>
+        <p:txBody>
+          <a:bodyPr>
+            <a:normAutofit/>
+          </a:bodyPr>
+          <a:lstStyle/>
+          <a:p>
+            <a:pPr algn="ctr"/>
+            <a:r>
+              <a:rPr lang="en-US" sz="8000" dirty="0">
+                <a:solidFill>
+                  <a:srgbClr val="00A79D"/>
+                </a:solidFill>
+                <a:latin typeface="Bahnschrift" panose="020B0502040204020203" pitchFamily="34" charset="0"/>
+              </a:rPr>
+              <a:t>Demo Time!</a:t>
+            </a:r>
+          </a:p>
+        </p:txBody>
+      </p:sp>
+    </p:spTree>
+    <p:extLst>
+      <p:ext uri="{BB962C8B-B14F-4D97-AF65-F5344CB8AC3E}">
+        <p14:creationId xmlns:p14="http://schemas.microsoft.com/office/powerpoint/2010/main" val="1142348781"/>
+      </p:ext>
+    </p:extLst>
+  </p:cSld>
+  <p:clrMapOvr>
+    <a:masterClrMapping/>
+  </p:clrMapOvr>
+</p:sld>
+</file>
+
+<file path=ppt/slides/slide27.xml><?xml version="1.0" encoding="utf-8"?>
+<p:sld xmlns:a="http://schemas.openxmlformats.org/drawingml/2006/main" xmlns:r="http://schemas.openxmlformats.org/officeDocument/2006/relationships" xmlns:p="http://schemas.openxmlformats.org/presentationml/2006/main">
+  <p:cSld>
+    <p:spTree>
+      <p:nvGrpSpPr>
+        <p:cNvPr id="1" name=""/>
+        <p:cNvGrpSpPr/>
+        <p:nvPr/>
+      </p:nvGrpSpPr>
+      <p:grpSpPr>
+        <a:xfrm>
+          <a:off x="0" y="0"/>
+          <a:ext cx="0" cy="0"/>
+          <a:chOff x="0" y="0"/>
+          <a:chExt cx="0" cy="0"/>
+        </a:xfrm>
+      </p:grpSpPr>
+      <p:sp>
+        <p:nvSpPr>
+          <p:cNvPr id="2" name="Title 1">
+            <a:extLst>
+              <a:ext uri="{FF2B5EF4-FFF2-40B4-BE49-F238E27FC236}">
+                <a16:creationId xmlns:a16="http://schemas.microsoft.com/office/drawing/2014/main" id="{264E5970-3812-4B23-BF67-26CB2C14C1EB}"/>
+              </a:ext>
+            </a:extLst>
+          </p:cNvPr>
+          <p:cNvSpPr>
+            <a:spLocks noGrp="1"/>
+          </p:cNvSpPr>
+          <p:nvPr>
+            <p:ph type="title"/>
+          </p:nvPr>
+        </p:nvSpPr>
         <p:spPr/>
         <p:txBody>
           <a:bodyPr>
@@ -8318,8 +8390,17 @@
               <a:rPr lang="en-US" sz="2400" dirty="0">
                 <a:latin typeface="Bahnschrift" panose="020B0502040204020203" pitchFamily="34" charset="0"/>
               </a:rPr>
-              <a:t>We can then use that Text object to display the tracked status of our objects in the Dictionary.</a:t>
-            </a:r>
+              <a:t>Now that we have one object being tracked, let’s try and track every item in </a:t>
+            </a:r>
+            <a:r>
+              <a:rPr lang="en-US" sz="2400">
+                <a:latin typeface="Bahnschrift" panose="020B0502040204020203" pitchFamily="34" charset="0"/>
+              </a:rPr>
+              <a:t>the Dictionary.</a:t>
+            </a:r>
+            <a:endParaRPr lang="en-US" sz="2400" dirty="0">
+              <a:latin typeface="Bahnschrift" panose="020B0502040204020203" pitchFamily="34" charset="0"/>
+            </a:endParaRPr>
           </a:p>
           <a:p>
             <a:endParaRPr lang="en-US" sz="2400" dirty="0">
@@ -8383,7 +8464,7 @@
 </p:sld>
 </file>
 
-<file path=ppt/slides/slide27.xml><?xml version="1.0" encoding="utf-8"?>
+<file path=ppt/slides/slide28.xml><?xml version="1.0" encoding="utf-8"?>
 <p:sld xmlns:a="http://schemas.openxmlformats.org/drawingml/2006/main" xmlns:r="http://schemas.openxmlformats.org/officeDocument/2006/relationships" xmlns:p="http://schemas.openxmlformats.org/presentationml/2006/main">
   <p:cSld>
     <p:spTree>
@@ -9257,7 +9338,7 @@
 </p:sld>
 </file>
 
-<file path=ppt/slides/slide28.xml><?xml version="1.0" encoding="utf-8"?>
+<file path=ppt/slides/slide29.xml><?xml version="1.0" encoding="utf-8"?>
 <p:sld xmlns:a="http://schemas.openxmlformats.org/drawingml/2006/main" xmlns:r="http://schemas.openxmlformats.org/officeDocument/2006/relationships" xmlns:p="http://schemas.openxmlformats.org/presentationml/2006/main">
   <p:cSld>
     <p:spTree>
@@ -9663,77 +9744,6 @@
     <p:extLst>
       <p:ext uri="{BB962C8B-B14F-4D97-AF65-F5344CB8AC3E}">
         <p14:creationId xmlns:p14="http://schemas.microsoft.com/office/powerpoint/2010/main" val="3792440324"/>
-      </p:ext>
-    </p:extLst>
-  </p:cSld>
-  <p:clrMapOvr>
-    <a:masterClrMapping/>
-  </p:clrMapOvr>
-</p:sld>
-</file>
-
-<file path=ppt/slides/slide29.xml><?xml version="1.0" encoding="utf-8"?>
-<p:sld xmlns:a="http://schemas.openxmlformats.org/drawingml/2006/main" xmlns:r="http://schemas.openxmlformats.org/officeDocument/2006/relationships" xmlns:p="http://schemas.openxmlformats.org/presentationml/2006/main">
-  <p:cSld>
-    <p:spTree>
-      <p:nvGrpSpPr>
-        <p:cNvPr id="1" name=""/>
-        <p:cNvGrpSpPr/>
-        <p:nvPr/>
-      </p:nvGrpSpPr>
-      <p:grpSpPr>
-        <a:xfrm>
-          <a:off x="0" y="0"/>
-          <a:ext cx="0" cy="0"/>
-          <a:chOff x="0" y="0"/>
-          <a:chExt cx="0" cy="0"/>
-        </a:xfrm>
-      </p:grpSpPr>
-      <p:sp>
-        <p:nvSpPr>
-          <p:cNvPr id="13" name="Title 1">
-            <a:extLst>
-              <a:ext uri="{FF2B5EF4-FFF2-40B4-BE49-F238E27FC236}">
-                <a16:creationId xmlns:a16="http://schemas.microsoft.com/office/drawing/2014/main" id="{AFBCB11E-07F3-48B7-8B47-7E50039C99D4}"/>
-              </a:ext>
-            </a:extLst>
-          </p:cNvPr>
-          <p:cNvSpPr>
-            <a:spLocks noGrp="1"/>
-          </p:cNvSpPr>
-          <p:nvPr>
-            <p:ph type="title"/>
-          </p:nvPr>
-        </p:nvSpPr>
-        <p:spPr>
-          <a:xfrm>
-            <a:off x="838200" y="365125"/>
-            <a:ext cx="10515600" cy="5229340"/>
-          </a:xfrm>
-        </p:spPr>
-        <p:txBody>
-          <a:bodyPr>
-            <a:normAutofit/>
-          </a:bodyPr>
-          <a:lstStyle/>
-          <a:p>
-            <a:pPr algn="ctr"/>
-            <a:r>
-              <a:rPr lang="en-US" sz="8000" dirty="0">
-                <a:solidFill>
-                  <a:srgbClr val="00A79D"/>
-                </a:solidFill>
-                <a:latin typeface="Bahnschrift" panose="020B0502040204020203" pitchFamily="34" charset="0"/>
-              </a:rPr>
-              <a:t>Demo Time!</a:t>
-            </a:r>
-          </a:p>
-        </p:txBody>
-      </p:sp>
-    </p:spTree>
-    <p:extLst>
-      <p:ext uri="{BB962C8B-B14F-4D97-AF65-F5344CB8AC3E}">
-        <p14:creationId xmlns:p14="http://schemas.microsoft.com/office/powerpoint/2010/main" val="2261331960"/>
       </p:ext>
     </p:extLst>
   </p:cSld>
@@ -10294,6 +10304,77 @@
 </file>
 
 <file path=ppt/slides/slide30.xml><?xml version="1.0" encoding="utf-8"?>
+<p:sld xmlns:a="http://schemas.openxmlformats.org/drawingml/2006/main" xmlns:r="http://schemas.openxmlformats.org/officeDocument/2006/relationships" xmlns:p="http://schemas.openxmlformats.org/presentationml/2006/main">
+  <p:cSld>
+    <p:spTree>
+      <p:nvGrpSpPr>
+        <p:cNvPr id="1" name=""/>
+        <p:cNvGrpSpPr/>
+        <p:nvPr/>
+      </p:nvGrpSpPr>
+      <p:grpSpPr>
+        <a:xfrm>
+          <a:off x="0" y="0"/>
+          <a:ext cx="0" cy="0"/>
+          <a:chOff x="0" y="0"/>
+          <a:chExt cx="0" cy="0"/>
+        </a:xfrm>
+      </p:grpSpPr>
+      <p:sp>
+        <p:nvSpPr>
+          <p:cNvPr id="13" name="Title 1">
+            <a:extLst>
+              <a:ext uri="{FF2B5EF4-FFF2-40B4-BE49-F238E27FC236}">
+                <a16:creationId xmlns:a16="http://schemas.microsoft.com/office/drawing/2014/main" id="{AFBCB11E-07F3-48B7-8B47-7E50039C99D4}"/>
+              </a:ext>
+            </a:extLst>
+          </p:cNvPr>
+          <p:cNvSpPr>
+            <a:spLocks noGrp="1"/>
+          </p:cNvSpPr>
+          <p:nvPr>
+            <p:ph type="title"/>
+          </p:nvPr>
+        </p:nvSpPr>
+        <p:spPr>
+          <a:xfrm>
+            <a:off x="838200" y="365125"/>
+            <a:ext cx="10515600" cy="5229340"/>
+          </a:xfrm>
+        </p:spPr>
+        <p:txBody>
+          <a:bodyPr>
+            <a:normAutofit/>
+          </a:bodyPr>
+          <a:lstStyle/>
+          <a:p>
+            <a:pPr algn="ctr"/>
+            <a:r>
+              <a:rPr lang="en-US" sz="8000" dirty="0">
+                <a:solidFill>
+                  <a:srgbClr val="00A79D"/>
+                </a:solidFill>
+                <a:latin typeface="Bahnschrift" panose="020B0502040204020203" pitchFamily="34" charset="0"/>
+              </a:rPr>
+              <a:t>Demo Time!</a:t>
+            </a:r>
+          </a:p>
+        </p:txBody>
+      </p:sp>
+    </p:spTree>
+    <p:extLst>
+      <p:ext uri="{BB962C8B-B14F-4D97-AF65-F5344CB8AC3E}">
+        <p14:creationId xmlns:p14="http://schemas.microsoft.com/office/powerpoint/2010/main" val="2261331960"/>
+      </p:ext>
+    </p:extLst>
+  </p:cSld>
+  <p:clrMapOvr>
+    <a:masterClrMapping/>
+  </p:clrMapOvr>
+</p:sld>
+</file>
+
+<file path=ppt/slides/slide31.xml><?xml version="1.0" encoding="utf-8"?>
 <p:sld xmlns:a="http://schemas.openxmlformats.org/drawingml/2006/main" xmlns:r="http://schemas.openxmlformats.org/officeDocument/2006/relationships" xmlns:p="http://schemas.openxmlformats.org/presentationml/2006/main">
   <p:cSld>
     <p:spTree>

</xml_diff>